<commit_message>
Lista II de Sociais
</commit_message>
<xml_diff>
--- a/7º Período/Linguagens de Programação III/Minicurso NodeJS/Minicurso v1.pptx
+++ b/7º Período/Linguagens de Programação III/Minicurso NodeJS/Minicurso v1.pptx
@@ -232,7 +232,7 @@
           <a:p>
             <a:fld id="{D1F5F502-C930-4710-A818-0F5A3FDC8C67}" type="datetimeFigureOut">
               <a:rPr lang="pt-BR" smtClean="0"/>
-              <a:t>04/07/2018</a:t>
+              <a:t>05/07/2018</a:t>
             </a:fld>
             <a:endParaRPr lang="pt-BR"/>
           </a:p>
@@ -858,7 +858,7 @@
           <a:p>
             <a:fld id="{EE30C7F4-FC5E-4DE1-9C0D-471B69666234}" type="datetimeFigureOut">
               <a:rPr lang="pt-BR" smtClean="0"/>
-              <a:t>04/07/2018</a:t>
+              <a:t>05/07/2018</a:t>
             </a:fld>
             <a:endParaRPr lang="pt-BR"/>
           </a:p>
@@ -1056,7 +1056,7 @@
           <a:p>
             <a:fld id="{EE30C7F4-FC5E-4DE1-9C0D-471B69666234}" type="datetimeFigureOut">
               <a:rPr lang="pt-BR" smtClean="0"/>
-              <a:t>04/07/2018</a:t>
+              <a:t>05/07/2018</a:t>
             </a:fld>
             <a:endParaRPr lang="pt-BR"/>
           </a:p>
@@ -1264,7 +1264,7 @@
           <a:p>
             <a:fld id="{EE30C7F4-FC5E-4DE1-9C0D-471B69666234}" type="datetimeFigureOut">
               <a:rPr lang="pt-BR" smtClean="0"/>
-              <a:t>04/07/2018</a:t>
+              <a:t>05/07/2018</a:t>
             </a:fld>
             <a:endParaRPr lang="pt-BR"/>
           </a:p>
@@ -1817,7 +1817,7 @@
           <a:p>
             <a:fld id="{EE30C7F4-FC5E-4DE1-9C0D-471B69666234}" type="datetimeFigureOut">
               <a:rPr lang="pt-BR" smtClean="0"/>
-              <a:t>04/07/2018</a:t>
+              <a:t>05/07/2018</a:t>
             </a:fld>
             <a:endParaRPr lang="pt-BR"/>
           </a:p>
@@ -2092,7 +2092,7 @@
           <a:p>
             <a:fld id="{EE30C7F4-FC5E-4DE1-9C0D-471B69666234}" type="datetimeFigureOut">
               <a:rPr lang="pt-BR" smtClean="0"/>
-              <a:t>04/07/2018</a:t>
+              <a:t>05/07/2018</a:t>
             </a:fld>
             <a:endParaRPr lang="pt-BR"/>
           </a:p>
@@ -2357,7 +2357,7 @@
           <a:p>
             <a:fld id="{EE30C7F4-FC5E-4DE1-9C0D-471B69666234}" type="datetimeFigureOut">
               <a:rPr lang="pt-BR" smtClean="0"/>
-              <a:t>04/07/2018</a:t>
+              <a:t>05/07/2018</a:t>
             </a:fld>
             <a:endParaRPr lang="pt-BR"/>
           </a:p>
@@ -2769,7 +2769,7 @@
           <a:p>
             <a:fld id="{EE30C7F4-FC5E-4DE1-9C0D-471B69666234}" type="datetimeFigureOut">
               <a:rPr lang="pt-BR" smtClean="0"/>
-              <a:t>04/07/2018</a:t>
+              <a:t>05/07/2018</a:t>
             </a:fld>
             <a:endParaRPr lang="pt-BR"/>
           </a:p>
@@ -2910,7 +2910,7 @@
           <a:p>
             <a:fld id="{EE30C7F4-FC5E-4DE1-9C0D-471B69666234}" type="datetimeFigureOut">
               <a:rPr lang="pt-BR" smtClean="0"/>
-              <a:t>04/07/2018</a:t>
+              <a:t>05/07/2018</a:t>
             </a:fld>
             <a:endParaRPr lang="pt-BR"/>
           </a:p>
@@ -3023,7 +3023,7 @@
           <a:p>
             <a:fld id="{EE30C7F4-FC5E-4DE1-9C0D-471B69666234}" type="datetimeFigureOut">
               <a:rPr lang="pt-BR" smtClean="0"/>
-              <a:t>04/07/2018</a:t>
+              <a:t>05/07/2018</a:t>
             </a:fld>
             <a:endParaRPr lang="pt-BR"/>
           </a:p>
@@ -3334,7 +3334,7 @@
           <a:p>
             <a:fld id="{EE30C7F4-FC5E-4DE1-9C0D-471B69666234}" type="datetimeFigureOut">
               <a:rPr lang="pt-BR" smtClean="0"/>
-              <a:t>04/07/2018</a:t>
+              <a:t>05/07/2018</a:t>
             </a:fld>
             <a:endParaRPr lang="pt-BR"/>
           </a:p>
@@ -3622,7 +3622,7 @@
           <a:p>
             <a:fld id="{EE30C7F4-FC5E-4DE1-9C0D-471B69666234}" type="datetimeFigureOut">
               <a:rPr lang="pt-BR" smtClean="0"/>
-              <a:t>04/07/2018</a:t>
+              <a:t>05/07/2018</a:t>
             </a:fld>
             <a:endParaRPr lang="pt-BR"/>
           </a:p>
@@ -3863,7 +3863,7 @@
           <a:p>
             <a:fld id="{EE30C7F4-FC5E-4DE1-9C0D-471B69666234}" type="datetimeFigureOut">
               <a:rPr lang="pt-BR" smtClean="0"/>
-              <a:t>04/07/2018</a:t>
+              <a:t>05/07/2018</a:t>
             </a:fld>
             <a:endParaRPr lang="pt-BR"/>
           </a:p>
@@ -14427,25 +14427,8 @@
               <a:buNone/>
             </a:pPr>
             <a:r>
-              <a:rPr lang="sv-SE" dirty="0">
-                <a:latin typeface="Consolas" panose="020B0609020204030204" pitchFamily="49" charset="0"/>
-              </a:rPr>
-              <a:t>$(</a:t>
-            </a:r>
-            <a:r>
-              <a:rPr lang="sv-SE" dirty="0">
-                <a:solidFill>
-                  <a:srgbClr val="0070C0"/>
-                </a:solidFill>
-                <a:latin typeface="Consolas" panose="020B0609020204030204" pitchFamily="49" charset="0"/>
-              </a:rPr>
-              <a:t>function</a:t>
-            </a:r>
-            <a:r>
-              <a:rPr lang="sv-SE" dirty="0">
-                <a:latin typeface="Consolas" panose="020B0609020204030204" pitchFamily="49" charset="0"/>
-              </a:rPr>
-              <a:t> () {</a:t>
+              <a:rPr lang="sv-SE" dirty="0"/>
+              <a:t>$(function () {</a:t>
             </a:r>
           </a:p>
           <a:p>
@@ -14459,42 +14442,8 @@
               <a:buNone/>
             </a:pPr>
             <a:r>
-              <a:rPr lang="sv-SE" dirty="0">
-                <a:latin typeface="Consolas" panose="020B0609020204030204" pitchFamily="49" charset="0"/>
-              </a:rPr>
-              <a:t>    </a:t>
-            </a:r>
-            <a:r>
-              <a:rPr lang="sv-SE" dirty="0">
-                <a:solidFill>
-                  <a:srgbClr val="0070C0"/>
-                </a:solidFill>
-                <a:latin typeface="Consolas" panose="020B0609020204030204" pitchFamily="49" charset="0"/>
-              </a:rPr>
-              <a:t>var</a:t>
-            </a:r>
-            <a:r>
-              <a:rPr lang="sv-SE" dirty="0">
-                <a:latin typeface="Consolas" panose="020B0609020204030204" pitchFamily="49" charset="0"/>
-              </a:rPr>
-              <a:t> socket = </a:t>
-            </a:r>
-            <a:r>
-              <a:rPr lang="sv-SE" dirty="0">
-                <a:solidFill>
-                  <a:schemeClr val="accent4">
-                    <a:lumMod val="50000"/>
-                  </a:schemeClr>
-                </a:solidFill>
-                <a:latin typeface="Consolas" panose="020B0609020204030204" pitchFamily="49" charset="0"/>
-              </a:rPr>
-              <a:t>io</a:t>
-            </a:r>
-            <a:r>
-              <a:rPr lang="sv-SE" dirty="0">
-                <a:latin typeface="Consolas" panose="020B0609020204030204" pitchFamily="49" charset="0"/>
-              </a:rPr>
-              <a:t>();</a:t>
+              <a:rPr lang="sv-SE" dirty="0"/>
+              <a:t>    var socket = io();</a:t>
             </a:r>
           </a:p>
           <a:p>
@@ -14508,57 +14457,8 @@
               <a:buNone/>
             </a:pPr>
             <a:r>
-              <a:rPr lang="sv-SE" dirty="0">
-                <a:latin typeface="Consolas" panose="020B0609020204030204" pitchFamily="49" charset="0"/>
-              </a:rPr>
-              <a:t>    $(</a:t>
-            </a:r>
-            <a:r>
-              <a:rPr lang="sv-SE" dirty="0">
-                <a:solidFill>
-                  <a:srgbClr val="C00000"/>
-                </a:solidFill>
-                <a:latin typeface="Consolas" panose="020B0609020204030204" pitchFamily="49" charset="0"/>
-              </a:rPr>
-              <a:t>'form'</a:t>
-            </a:r>
-            <a:r>
-              <a:rPr lang="sv-SE" dirty="0">
-                <a:latin typeface="Consolas" panose="020B0609020204030204" pitchFamily="49" charset="0"/>
-              </a:rPr>
-              <a:t>).</a:t>
-            </a:r>
-            <a:r>
-              <a:rPr lang="sv-SE" dirty="0">
-                <a:solidFill>
-                  <a:schemeClr val="accent4">
-                    <a:lumMod val="50000"/>
-                  </a:schemeClr>
-                </a:solidFill>
-                <a:latin typeface="Consolas" panose="020B0609020204030204" pitchFamily="49" charset="0"/>
-              </a:rPr>
-              <a:t>submit</a:t>
-            </a:r>
-            <a:r>
-              <a:rPr lang="sv-SE" dirty="0">
-                <a:latin typeface="Consolas" panose="020B0609020204030204" pitchFamily="49" charset="0"/>
-              </a:rPr>
-              <a:t>(</a:t>
-            </a:r>
-            <a:r>
-              <a:rPr lang="sv-SE" dirty="0">
-                <a:solidFill>
-                  <a:srgbClr val="0070C0"/>
-                </a:solidFill>
-                <a:latin typeface="Consolas" panose="020B0609020204030204" pitchFamily="49" charset="0"/>
-              </a:rPr>
-              <a:t>function</a:t>
-            </a:r>
-            <a:r>
-              <a:rPr lang="sv-SE" dirty="0">
-                <a:latin typeface="Consolas" panose="020B0609020204030204" pitchFamily="49" charset="0"/>
-              </a:rPr>
-              <a:t> () {</a:t>
+              <a:rPr lang="sv-SE" dirty="0"/>
+              <a:t>    $('form').submit(function () {</a:t>
             </a:r>
           </a:p>
           <a:p>
@@ -14572,74 +14472,8 @@
               <a:buNone/>
             </a:pPr>
             <a:r>
-              <a:rPr lang="sv-SE" dirty="0">
-                <a:latin typeface="Consolas" panose="020B0609020204030204" pitchFamily="49" charset="0"/>
-              </a:rPr>
-              <a:t>        socket.</a:t>
-            </a:r>
-            <a:r>
-              <a:rPr lang="sv-SE" dirty="0">
-                <a:solidFill>
-                  <a:schemeClr val="accent4">
-                    <a:lumMod val="50000"/>
-                  </a:schemeClr>
-                </a:solidFill>
-                <a:latin typeface="Consolas" panose="020B0609020204030204" pitchFamily="49" charset="0"/>
-              </a:rPr>
-              <a:t>emit</a:t>
-            </a:r>
-            <a:r>
-              <a:rPr lang="sv-SE" dirty="0">
-                <a:latin typeface="Consolas" panose="020B0609020204030204" pitchFamily="49" charset="0"/>
-              </a:rPr>
-              <a:t>(</a:t>
-            </a:r>
-            <a:r>
-              <a:rPr lang="sv-SE" dirty="0">
-                <a:solidFill>
-                  <a:srgbClr val="C00000"/>
-                </a:solidFill>
-                <a:latin typeface="Consolas" panose="020B0609020204030204" pitchFamily="49" charset="0"/>
-              </a:rPr>
-              <a:t>'chat message'</a:t>
-            </a:r>
-            <a:r>
-              <a:rPr lang="sv-SE" dirty="0">
-                <a:latin typeface="Consolas" panose="020B0609020204030204" pitchFamily="49" charset="0"/>
-              </a:rPr>
-              <a:t>, $(</a:t>
-            </a:r>
-            <a:r>
-              <a:rPr lang="sv-SE" dirty="0">
-                <a:solidFill>
-                  <a:srgbClr val="C00000"/>
-                </a:solidFill>
-                <a:latin typeface="Consolas" panose="020B0609020204030204" pitchFamily="49" charset="0"/>
-              </a:rPr>
-              <a:t>'#m'</a:t>
-            </a:r>
-            <a:r>
-              <a:rPr lang="sv-SE" dirty="0">
-                <a:latin typeface="Consolas" panose="020B0609020204030204" pitchFamily="49" charset="0"/>
-              </a:rPr>
-              <a:t>).</a:t>
-            </a:r>
-            <a:r>
-              <a:rPr lang="sv-SE" dirty="0">
-                <a:solidFill>
-                  <a:schemeClr val="accent4">
-                    <a:lumMod val="50000"/>
-                  </a:schemeClr>
-                </a:solidFill>
-                <a:latin typeface="Consolas" panose="020B0609020204030204" pitchFamily="49" charset="0"/>
-              </a:rPr>
-              <a:t>val</a:t>
-            </a:r>
-            <a:r>
-              <a:rPr lang="sv-SE" dirty="0">
-                <a:latin typeface="Consolas" panose="020B0609020204030204" pitchFamily="49" charset="0"/>
-              </a:rPr>
-              <a:t>());</a:t>
+              <a:rPr lang="sv-SE" dirty="0"/>
+              <a:t>        socket.emit('chat message', $('#m').val());</a:t>
             </a:r>
           </a:p>
           <a:p>
@@ -14653,42 +14487,8 @@
               <a:buNone/>
             </a:pPr>
             <a:r>
-              <a:rPr lang="sv-SE" dirty="0">
-                <a:latin typeface="Consolas" panose="020B0609020204030204" pitchFamily="49" charset="0"/>
-              </a:rPr>
-              <a:t>        $(</a:t>
-            </a:r>
-            <a:r>
-              <a:rPr lang="sv-SE" dirty="0">
-                <a:solidFill>
-                  <a:srgbClr val="C00000"/>
-                </a:solidFill>
-                <a:latin typeface="Consolas" panose="020B0609020204030204" pitchFamily="49" charset="0"/>
-              </a:rPr>
-              <a:t>'#m'</a:t>
-            </a:r>
-            <a:r>
-              <a:rPr lang="sv-SE" dirty="0">
-                <a:latin typeface="Consolas" panose="020B0609020204030204" pitchFamily="49" charset="0"/>
-              </a:rPr>
-              <a:t>).</a:t>
-            </a:r>
-            <a:r>
-              <a:rPr lang="sv-SE" dirty="0">
-                <a:solidFill>
-                  <a:schemeClr val="accent4">
-                    <a:lumMod val="50000"/>
-                  </a:schemeClr>
-                </a:solidFill>
-                <a:latin typeface="Consolas" panose="020B0609020204030204" pitchFamily="49" charset="0"/>
-              </a:rPr>
-              <a:t>val</a:t>
-            </a:r>
-            <a:r>
-              <a:rPr lang="sv-SE" dirty="0">
-                <a:latin typeface="Consolas" panose="020B0609020204030204" pitchFamily="49" charset="0"/>
-              </a:rPr>
-              <a:t>('');</a:t>
+              <a:rPr lang="sv-SE" dirty="0"/>
+              <a:t>        $('#m').val('');</a:t>
             </a:r>
           </a:p>
           <a:p>
@@ -14702,40 +14502,8 @@
               <a:buNone/>
             </a:pPr>
             <a:r>
-              <a:rPr lang="sv-SE" dirty="0">
-                <a:latin typeface="Consolas" panose="020B0609020204030204" pitchFamily="49" charset="0"/>
-              </a:rPr>
-              <a:t>        </a:t>
-            </a:r>
-            <a:r>
-              <a:rPr lang="sv-SE" dirty="0">
-                <a:solidFill>
-                  <a:srgbClr val="7030A0"/>
-                </a:solidFill>
-                <a:latin typeface="Consolas" panose="020B0609020204030204" pitchFamily="49" charset="0"/>
-              </a:rPr>
-              <a:t>return</a:t>
-            </a:r>
-            <a:r>
-              <a:rPr lang="sv-SE" dirty="0">
-                <a:latin typeface="Consolas" panose="020B0609020204030204" pitchFamily="49" charset="0"/>
-              </a:rPr>
-              <a:t> </a:t>
-            </a:r>
-            <a:r>
-              <a:rPr lang="sv-SE" dirty="0">
-                <a:solidFill>
-                  <a:srgbClr val="0070C0"/>
-                </a:solidFill>
-                <a:latin typeface="Consolas" panose="020B0609020204030204" pitchFamily="49" charset="0"/>
-              </a:rPr>
-              <a:t>false</a:t>
-            </a:r>
-            <a:r>
-              <a:rPr lang="sv-SE" dirty="0">
-                <a:latin typeface="Consolas" panose="020B0609020204030204" pitchFamily="49" charset="0"/>
-              </a:rPr>
-              <a:t>;</a:t>
+              <a:rPr lang="sv-SE" dirty="0"/>
+              <a:t>        return false;</a:t>
             </a:r>
           </a:p>
           <a:p>
@@ -14749,9 +14517,7 @@
               <a:buNone/>
             </a:pPr>
             <a:r>
-              <a:rPr lang="sv-SE" dirty="0">
-                <a:latin typeface="Consolas" panose="020B0609020204030204" pitchFamily="49" charset="0"/>
-              </a:rPr>
+              <a:rPr lang="sv-SE" dirty="0"/>
               <a:t>    });</a:t>
             </a:r>
           </a:p>
@@ -14766,57 +14532,8 @@
               <a:buNone/>
             </a:pPr>
             <a:r>
-              <a:rPr lang="sv-SE" dirty="0">
-                <a:latin typeface="Consolas" panose="020B0609020204030204" pitchFamily="49" charset="0"/>
-              </a:rPr>
-              <a:t>    socket.</a:t>
-            </a:r>
-            <a:r>
-              <a:rPr lang="sv-SE" dirty="0">
-                <a:solidFill>
-                  <a:schemeClr val="accent4">
-                    <a:lumMod val="50000"/>
-                  </a:schemeClr>
-                </a:solidFill>
-                <a:latin typeface="Consolas" panose="020B0609020204030204" pitchFamily="49" charset="0"/>
-              </a:rPr>
-              <a:t>on</a:t>
-            </a:r>
-            <a:r>
-              <a:rPr lang="sv-SE" dirty="0">
-                <a:latin typeface="Consolas" panose="020B0609020204030204" pitchFamily="49" charset="0"/>
-              </a:rPr>
-              <a:t>(</a:t>
-            </a:r>
-            <a:r>
-              <a:rPr lang="sv-SE" dirty="0">
-                <a:solidFill>
-                  <a:srgbClr val="C00000"/>
-                </a:solidFill>
-                <a:latin typeface="Consolas" panose="020B0609020204030204" pitchFamily="49" charset="0"/>
-              </a:rPr>
-              <a:t>'chat message'</a:t>
-            </a:r>
-            <a:r>
-              <a:rPr lang="sv-SE" dirty="0">
-                <a:latin typeface="Consolas" panose="020B0609020204030204" pitchFamily="49" charset="0"/>
-              </a:rPr>
-              <a:t>, </a:t>
-            </a:r>
-            <a:r>
-              <a:rPr lang="sv-SE" dirty="0">
-                <a:solidFill>
-                  <a:srgbClr val="0070C0"/>
-                </a:solidFill>
-                <a:latin typeface="Consolas" panose="020B0609020204030204" pitchFamily="49" charset="0"/>
-              </a:rPr>
-              <a:t>function</a:t>
-            </a:r>
-            <a:r>
-              <a:rPr lang="sv-SE" dirty="0">
-                <a:latin typeface="Consolas" panose="020B0609020204030204" pitchFamily="49" charset="0"/>
-              </a:rPr>
-              <a:t>(msg){</a:t>
+              <a:rPr lang="sv-SE" dirty="0"/>
+              <a:t>    socket.on('chat message', function(msg){</a:t>
             </a:r>
           </a:p>
           <a:p>
@@ -14830,74 +14547,8 @@
               <a:buNone/>
             </a:pPr>
             <a:r>
-              <a:rPr lang="sv-SE" dirty="0">
-                <a:latin typeface="Consolas" panose="020B0609020204030204" pitchFamily="49" charset="0"/>
-              </a:rPr>
-              <a:t>      $(</a:t>
-            </a:r>
-            <a:r>
-              <a:rPr lang="sv-SE" dirty="0">
-                <a:solidFill>
-                  <a:srgbClr val="C00000"/>
-                </a:solidFill>
-                <a:latin typeface="Consolas" panose="020B0609020204030204" pitchFamily="49" charset="0"/>
-              </a:rPr>
-              <a:t>'#messages'</a:t>
-            </a:r>
-            <a:r>
-              <a:rPr lang="sv-SE" dirty="0">
-                <a:latin typeface="Consolas" panose="020B0609020204030204" pitchFamily="49" charset="0"/>
-              </a:rPr>
-              <a:t>).</a:t>
-            </a:r>
-            <a:r>
-              <a:rPr lang="sv-SE" dirty="0">
-                <a:solidFill>
-                  <a:schemeClr val="accent4">
-                    <a:lumMod val="50000"/>
-                  </a:schemeClr>
-                </a:solidFill>
-                <a:latin typeface="Consolas" panose="020B0609020204030204" pitchFamily="49" charset="0"/>
-              </a:rPr>
-              <a:t>append</a:t>
-            </a:r>
-            <a:r>
-              <a:rPr lang="sv-SE" dirty="0">
-                <a:latin typeface="Consolas" panose="020B0609020204030204" pitchFamily="49" charset="0"/>
-              </a:rPr>
-              <a:t>($(</a:t>
-            </a:r>
-            <a:r>
-              <a:rPr lang="sv-SE" dirty="0">
-                <a:solidFill>
-                  <a:srgbClr val="C00000"/>
-                </a:solidFill>
-                <a:latin typeface="Consolas" panose="020B0609020204030204" pitchFamily="49" charset="0"/>
-              </a:rPr>
-              <a:t>'&lt;li&gt;'</a:t>
-            </a:r>
-            <a:r>
-              <a:rPr lang="sv-SE" dirty="0">
-                <a:latin typeface="Consolas" panose="020B0609020204030204" pitchFamily="49" charset="0"/>
-              </a:rPr>
-              <a:t>).</a:t>
-            </a:r>
-            <a:r>
-              <a:rPr lang="sv-SE" dirty="0">
-                <a:solidFill>
-                  <a:schemeClr val="accent4">
-                    <a:lumMod val="50000"/>
-                  </a:schemeClr>
-                </a:solidFill>
-                <a:latin typeface="Consolas" panose="020B0609020204030204" pitchFamily="49" charset="0"/>
-              </a:rPr>
-              <a:t>text</a:t>
-            </a:r>
-            <a:r>
-              <a:rPr lang="sv-SE" dirty="0">
-                <a:latin typeface="Consolas" panose="020B0609020204030204" pitchFamily="49" charset="0"/>
-              </a:rPr>
-              <a:t>(msg));</a:t>
+              <a:rPr lang="sv-SE" dirty="0"/>
+              <a:t>      $('#messages').append($('&lt;li&gt;').text(msg));</a:t>
             </a:r>
           </a:p>
           <a:p>
@@ -14911,9 +14562,7 @@
               <a:buNone/>
             </a:pPr>
             <a:r>
-              <a:rPr lang="sv-SE" dirty="0">
-                <a:latin typeface="Consolas" panose="020B0609020204030204" pitchFamily="49" charset="0"/>
-              </a:rPr>
+              <a:rPr lang="sv-SE" dirty="0"/>
               <a:t>    });</a:t>
             </a:r>
           </a:p>
@@ -14928,9 +14577,7 @@
               <a:buNone/>
             </a:pPr>
             <a:r>
-              <a:rPr lang="sv-SE" dirty="0">
-                <a:latin typeface="Consolas" panose="020B0609020204030204" pitchFamily="49" charset="0"/>
-              </a:rPr>
+              <a:rPr lang="sv-SE" dirty="0"/>
               <a:t>});</a:t>
             </a:r>
           </a:p>

</xml_diff>